<commit_message>
Update the logger to save its output to a file whose name is now specified in the security configuration properties file. This also includes specifying the max amount of data that can go in each individual log. Cleanup the SecurityConfiguration javadocs.
</commit_message>
<xml_diff>
--- a/documentation/ESAPI Javadoc Pictures.pptx
+++ b/documentation/ESAPI Javadoc Pictures.pptx
@@ -3155,8 +3155,8 @@
     <dgm:cxn modelId="{D49C8A82-7903-4F20-A28B-3F40DAF6C6DC}" srcId="{C95CFFFC-7BAB-471D-AD57-E8B1AD48F67F}" destId="{B0295E24-C12C-44E8-A1AA-81E139E8C686}" srcOrd="9" destOrd="0" parTransId="{7A5B7810-9249-4C8A-9BBF-10F254A4B485}" sibTransId="{08938B07-AA6A-4BCA-8EF1-015571AE360F}"/>
     <dgm:cxn modelId="{6DC500A6-DBB4-4159-8443-5C1EA77A0A0D}" srcId="{C95CFFFC-7BAB-471D-AD57-E8B1AD48F67F}" destId="{174E7D08-880A-400C-BA20-3B667022FD34}" srcOrd="1" destOrd="0" parTransId="{D9AB2B17-773B-4C16-B3D6-BB0EE14F150F}" sibTransId="{BFBF7DEC-8C31-4149-BBF2-6E0ABC809E13}"/>
     <dgm:cxn modelId="{95D4A454-C02B-49B9-BAAF-E254ECB3A69A}" srcId="{C95CFFFC-7BAB-471D-AD57-E8B1AD48F67F}" destId="{B5CCDD8B-FC74-4449-A6C4-AE1EE95D10FB}" srcOrd="7" destOrd="0" parTransId="{05D17C0D-84AD-49BF-B370-44FE2124E299}" sibTransId="{1305D0CA-6C1D-4CC7-8102-C8936A6411C0}"/>
+    <dgm:cxn modelId="{F10A0DE7-8FFC-4145-8418-D958FA7D1493}" type="presOf" srcId="{FCC54787-A8A5-4ED0-9C44-DCA661B7E70A}" destId="{641D1ABE-D6AD-4DF0-B338-9F9A3F75D0CE}" srcOrd="0" destOrd="0" presId="urn:microsoft.com/office/officeart/2005/8/layout/hierarchy4"/>
     <dgm:cxn modelId="{29EEE4F4-4EA7-4BEA-9575-32EA10DC67BF}" type="presOf" srcId="{C95CFFFC-7BAB-471D-AD57-E8B1AD48F67F}" destId="{B2BCDAB2-FFE4-478F-8E30-EC5D46553CCE}" srcOrd="0" destOrd="0" presId="urn:microsoft.com/office/officeart/2005/8/layout/hierarchy4"/>
-    <dgm:cxn modelId="{F10A0DE7-8FFC-4145-8418-D958FA7D1493}" type="presOf" srcId="{FCC54787-A8A5-4ED0-9C44-DCA661B7E70A}" destId="{641D1ABE-D6AD-4DF0-B338-9F9A3F75D0CE}" srcOrd="0" destOrd="0" presId="urn:microsoft.com/office/officeart/2005/8/layout/hierarchy4"/>
     <dgm:cxn modelId="{289819E4-1300-4D3B-AD96-2E3D02ADECE8}" srcId="{C95CFFFC-7BAB-471D-AD57-E8B1AD48F67F}" destId="{675A6E7C-DEB5-41B6-B6EA-9864FEF7DAFC}" srcOrd="3" destOrd="0" parTransId="{16846935-2905-43EA-9F5D-8975EA56DDEB}" sibTransId="{A82CDB7E-779E-4AE5-AD5A-7AD1FDDDB8CD}"/>
     <dgm:cxn modelId="{5416452B-0F02-4598-932F-C126F22E92EF}" type="presOf" srcId="{B2FE1027-6E85-41C8-9A4C-E420DCBC52A7}" destId="{C5167C67-47E1-40A4-BEBE-FE2E97251587}" srcOrd="0" destOrd="0" presId="urn:microsoft.com/office/officeart/2005/8/layout/hierarchy4"/>
     <dgm:cxn modelId="{244EDF1E-7333-4518-A3CB-A7F849090FD4}" type="presOf" srcId="{CF62263B-AC40-4C2E-AF55-E373E63BA1B5}" destId="{46E4D9A1-3176-43A4-85E6-FC1242530567}" srcOrd="0" destOrd="0" presId="urn:microsoft.com/office/officeart/2005/8/layout/hierarchy4"/>
@@ -4969,71 +4969,71 @@
     </dgm:pt>
   </dgm:ptLst>
   <dgm:cxnLst>
+    <dgm:cxn modelId="{B3ECD102-5FDD-4276-B6CA-C1764FB8BCF4}" type="presOf" srcId="{6EF07664-D48C-4917-BFBD-08DB8C68251F}" destId="{F749CD68-74B8-49A9-81E4-07F3CE1FCE0A}" srcOrd="0" destOrd="0" presId="urn:microsoft.com/office/officeart/2005/8/layout/lProcess1"/>
+    <dgm:cxn modelId="{05055B12-1E74-4EB2-BA6A-C6B1233A6E99}" type="presOf" srcId="{08747053-149D-471B-B170-B59D52A97313}" destId="{056A8768-C0C8-4387-8D87-25CB5E4C3677}" srcOrd="0" destOrd="0" presId="urn:microsoft.com/office/officeart/2005/8/layout/lProcess1"/>
+    <dgm:cxn modelId="{DC749A12-BC13-4509-8165-7D6CCEA5A157}" type="presOf" srcId="{CCEF4520-D58B-4CBA-BA7E-FB8ACAF80541}" destId="{411430FF-FF48-4D0B-9C34-5A7CCD3CC292}" srcOrd="0" destOrd="0" presId="urn:microsoft.com/office/officeart/2005/8/layout/lProcess1"/>
+    <dgm:cxn modelId="{028FD50E-ABCC-48AD-B918-90EA9F66D905}" srcId="{1BB0636C-C7F1-48A1-8271-46FCC3EFF219}" destId="{73AE9112-097F-4691-9164-8D0EB8CB76D9}" srcOrd="2" destOrd="0" parTransId="{01597230-898A-4494-82C4-5BAB5DCE8A80}" sibTransId="{346A265A-6EF0-43E7-AEDC-6AD1B6DDF85A}"/>
+    <dgm:cxn modelId="{2D78A0F9-AFAC-4983-BDEA-E2CD3F78DEF1}" type="presOf" srcId="{E54C6F2A-497C-4674-BC4B-029E14196524}" destId="{321DC9E4-1828-4EE3-ABDE-6EF207FFA05A}" srcOrd="0" destOrd="0" presId="urn:microsoft.com/office/officeart/2005/8/layout/lProcess1"/>
+    <dgm:cxn modelId="{90001CCB-52ED-4696-A008-6749B01BE337}" srcId="{186EA5F9-1BED-4C06-B182-B016FA331FFB}" destId="{60A4B496-B1DD-4990-BCA0-F4ED28F00137}" srcOrd="2" destOrd="0" parTransId="{057038AB-4A16-4F30-B6F9-B282D4D02CD5}" sibTransId="{7A650265-7FF4-480C-A8E7-12BAC875AA61}"/>
+    <dgm:cxn modelId="{0DDFF8AD-1C65-4436-8413-EFAA11AF2576}" type="presOf" srcId="{7CFC53EC-611C-44EB-B618-7875677B9893}" destId="{76F52F46-BAC2-4306-9498-EFC0E2E5EF03}" srcOrd="0" destOrd="0" presId="urn:microsoft.com/office/officeart/2005/8/layout/lProcess1"/>
+    <dgm:cxn modelId="{AF2B2E06-B66C-455F-9862-6CCF2DA9D487}" type="presOf" srcId="{7FFA533E-BFF8-4B89-92D1-07957357D3B5}" destId="{BCA9ED3A-6EA1-4F2C-969F-00240FBE72B9}" srcOrd="0" destOrd="0" presId="urn:microsoft.com/office/officeart/2005/8/layout/lProcess1"/>
+    <dgm:cxn modelId="{E21A1861-A885-404B-82E2-4E6DD03997AF}" srcId="{186EA5F9-1BED-4C06-B182-B016FA331FFB}" destId="{6161268B-89CE-44F0-B63C-93650AD9DFB1}" srcOrd="5" destOrd="0" parTransId="{95DAD433-C5C7-4CF6-8E99-95BCEF62E738}" sibTransId="{4641B145-6B04-4411-8AC9-7DD52129D40B}"/>
+    <dgm:cxn modelId="{C203885F-897F-4F48-A959-1564A9653E83}" type="presOf" srcId="{821A642D-700D-4E53-8E2A-631D151B86E5}" destId="{067AC13A-A371-44AB-9940-004A06B6B4CB}" srcOrd="0" destOrd="0" presId="urn:microsoft.com/office/officeart/2005/8/layout/lProcess1"/>
+    <dgm:cxn modelId="{4B6A62CF-D146-4CC5-A5B5-4BE7297BB017}" type="presOf" srcId="{FC6BDF1B-7666-4901-8933-E59C87501C83}" destId="{26F54F58-F169-4CAA-AEB3-26B67A97B3C8}" srcOrd="0" destOrd="0" presId="urn:microsoft.com/office/officeart/2005/8/layout/lProcess1"/>
+    <dgm:cxn modelId="{EAC1BCBB-117D-4CDF-BA66-07B2B711D05B}" srcId="{377E3500-8585-404E-9D08-4140C13B54E2}" destId="{186EA5F9-1BED-4C06-B182-B016FA331FFB}" srcOrd="1" destOrd="0" parTransId="{DED5BC83-53B8-49CF-99B2-6D9118DB924B}" sibTransId="{E2B20211-2173-4A3C-A6D1-AAE1BB5971A0}"/>
+    <dgm:cxn modelId="{52FB74AC-2C5E-4D9F-B33A-79B1346C5D0B}" type="presOf" srcId="{5356D253-13A4-4E63-9090-ACD4D516A1F9}" destId="{73A46A9C-C56D-49E2-A3F6-0D259BCDB23D}" srcOrd="0" destOrd="0" presId="urn:microsoft.com/office/officeart/2005/8/layout/lProcess1"/>
+    <dgm:cxn modelId="{BCB8B75F-C7DE-468B-86B2-1B86169A4EC0}" type="presOf" srcId="{1BB0636C-C7F1-48A1-8271-46FCC3EFF219}" destId="{189665C0-EEDD-459E-8D4A-8E338650848B}" srcOrd="0" destOrd="0" presId="urn:microsoft.com/office/officeart/2005/8/layout/lProcess1"/>
+    <dgm:cxn modelId="{97C18EB8-A7AD-4785-8A22-60A43A86292A}" srcId="{186EA5F9-1BED-4C06-B182-B016FA331FFB}" destId="{FC6BDF1B-7666-4901-8933-E59C87501C83}" srcOrd="4" destOrd="0" parTransId="{423A87BC-601A-45E9-BAB5-4E74775C65AB}" sibTransId="{82FA9713-DD07-416F-88F4-532B5F2EAC90}"/>
+    <dgm:cxn modelId="{1718DFC8-01ED-4D0D-A005-335FA176F77D}" type="presOf" srcId="{1645CB60-6D54-4567-A27F-A13ADC81D2E4}" destId="{B37383AF-9B7A-42A6-B08D-32613F242FB7}" srcOrd="0" destOrd="0" presId="urn:microsoft.com/office/officeart/2005/8/layout/lProcess1"/>
+    <dgm:cxn modelId="{5722AB07-A8D1-4201-ABDD-6010F1E241D9}" type="presOf" srcId="{8E2A2579-89C7-4BEA-8BF4-1DF44F6F55E6}" destId="{4E44D5A5-63B1-41D5-9FDF-F41902F20B19}" srcOrd="0" destOrd="0" presId="urn:microsoft.com/office/officeart/2005/8/layout/lProcess1"/>
+    <dgm:cxn modelId="{57C6F165-A568-4C7A-8590-54E80981EEB4}" srcId="{186EA5F9-1BED-4C06-B182-B016FA331FFB}" destId="{0AA5AB4A-EACF-4C20-B35B-E19CE7E60213}" srcOrd="9" destOrd="0" parTransId="{27C745D0-C849-426D-99CC-7751E9DF5859}" sibTransId="{B568009E-334F-44AB-AF8E-E54120294878}"/>
+    <dgm:cxn modelId="{D4450FC6-6620-4792-B396-E8E19DBE44F4}" srcId="{1BB0636C-C7F1-48A1-8271-46FCC3EFF219}" destId="{360C0236-8E7C-4A9B-86F4-ADC4AA76ECD1}" srcOrd="6" destOrd="0" parTransId="{B57EA4D9-ED4F-40C8-8106-240E80E97DFF}" sibTransId="{994012F0-68DB-4730-9C9C-A29CAF9753B4}"/>
+    <dgm:cxn modelId="{4B524FEA-E671-4B02-8703-C90053A3A966}" type="presOf" srcId="{0AD9C268-E417-4DBD-B145-00EFE77ED46C}" destId="{7BEB1777-A344-438B-BF3C-16D3BF0B94C8}" srcOrd="0" destOrd="0" presId="urn:microsoft.com/office/officeart/2005/8/layout/lProcess1"/>
+    <dgm:cxn modelId="{3D4C1769-DE4D-4AC7-960F-F50021005909}" type="presOf" srcId="{82FA9713-DD07-416F-88F4-532B5F2EAC90}" destId="{A0811A12-5B41-4B45-993D-6867CBD70BE7}" srcOrd="0" destOrd="0" presId="urn:microsoft.com/office/officeart/2005/8/layout/lProcess1"/>
+    <dgm:cxn modelId="{04C47416-BF13-4C0E-A0D7-2FAAEE6DAB10}" type="presOf" srcId="{703D37DA-9D04-48C7-9917-03C11B75579F}" destId="{FA2DC799-6746-4A73-AA04-A3161797863C}" srcOrd="0" destOrd="0" presId="urn:microsoft.com/office/officeart/2005/8/layout/lProcess1"/>
+    <dgm:cxn modelId="{87BC4E66-4B16-4A09-A820-4519C6C65DB7}" srcId="{1BB0636C-C7F1-48A1-8271-46FCC3EFF219}" destId="{61B9C7FC-4601-4633-97D9-AEFB53A31398}" srcOrd="3" destOrd="0" parTransId="{A45FF0C9-4F27-444E-96DC-E79BB01A6A14}" sibTransId="{EFD33CA1-C47A-4427-84FB-37C18717486F}"/>
+    <dgm:cxn modelId="{C37A0620-39E5-45DB-8CB0-7B544535EA5B}" type="presOf" srcId="{C89AF841-141A-4818-BA7B-C2C1BA7C1BB3}" destId="{C64FB877-5306-40BE-9CA9-5764B3AFBE36}" srcOrd="0" destOrd="0" presId="urn:microsoft.com/office/officeart/2005/8/layout/lProcess1"/>
+    <dgm:cxn modelId="{C0A5EEB7-0734-4EDB-AE56-CA6E7780DBCF}" type="presOf" srcId="{61B9C7FC-4601-4633-97D9-AEFB53A31398}" destId="{AF0DE083-F133-40B8-9946-2424AE07A5D2}" srcOrd="0" destOrd="0" presId="urn:microsoft.com/office/officeart/2005/8/layout/lProcess1"/>
+    <dgm:cxn modelId="{C56F8FA8-9860-4169-A8E9-940430BED623}" type="presOf" srcId="{CA4A9E74-B7DE-465C-A042-3A04D18EA4AB}" destId="{2B631270-A20E-48C9-8196-9D41D4D19ACE}" srcOrd="0" destOrd="0" presId="urn:microsoft.com/office/officeart/2005/8/layout/lProcess1"/>
+    <dgm:cxn modelId="{BE9D3FCA-3729-4C3A-A50A-DE38C8C8F35E}" srcId="{1BB0636C-C7F1-48A1-8271-46FCC3EFF219}" destId="{7FFA533E-BFF8-4B89-92D1-07957357D3B5}" srcOrd="8" destOrd="0" parTransId="{77E7F068-ED25-4D80-A150-EEA6358778C3}" sibTransId="{703D37DA-9D04-48C7-9917-03C11B75579F}"/>
+    <dgm:cxn modelId="{CABF9AA9-7FD7-4C75-9F19-D24F3AB0D3A1}" type="presOf" srcId="{565C5D44-E202-4762-BA12-A67015FE61F3}" destId="{3D7EA5B8-DFDF-4409-8C6A-F6473BAEF845}" srcOrd="0" destOrd="0" presId="urn:microsoft.com/office/officeart/2005/8/layout/lProcess1"/>
+    <dgm:cxn modelId="{992054C4-AAFA-46DF-AE80-2F7C11233426}" srcId="{1BB0636C-C7F1-48A1-8271-46FCC3EFF219}" destId="{0BF82AA6-96D5-4A7F-9EDF-BDBD6C4CE2B8}" srcOrd="9" destOrd="0" parTransId="{700B5907-8BCC-4D7D-89F5-5E2725D80FEA}" sibTransId="{67B033B4-13E0-43E4-B27D-76408437EA3F}"/>
+    <dgm:cxn modelId="{B11975DD-9194-4E36-8B4C-A0938DE06C7B}" type="presOf" srcId="{4A5812CE-7D24-4A4E-8D8D-151FB9BD13D6}" destId="{B9C94445-6ACC-47CD-AE48-DEC7FDC9F535}" srcOrd="0" destOrd="0" presId="urn:microsoft.com/office/officeart/2005/8/layout/lProcess1"/>
+    <dgm:cxn modelId="{8B3ADB41-ACAD-4C14-BFD7-99683923AE2E}" type="presOf" srcId="{377E3500-8585-404E-9D08-4140C13B54E2}" destId="{8E039649-0AE6-4E66-AE65-9E0C86962154}" srcOrd="0" destOrd="0" presId="urn:microsoft.com/office/officeart/2005/8/layout/lProcess1"/>
+    <dgm:cxn modelId="{117E3458-6A5A-4280-B736-CCB81967D6DC}" srcId="{186EA5F9-1BED-4C06-B182-B016FA331FFB}" destId="{91EF51DC-6A99-46F7-AFC2-BBA925CB8350}" srcOrd="8" destOrd="0" parTransId="{9BB9EFA5-867C-4266-AFF0-CEDE3D210E35}" sibTransId="{5356D253-13A4-4E63-9090-ACD4D516A1F9}"/>
+    <dgm:cxn modelId="{31D7DC1E-D0CC-47E9-9CA9-2C9D4CBC1584}" type="presOf" srcId="{4641B145-6B04-4411-8AC9-7DD52129D40B}" destId="{E0C0A71F-9DCE-4CCE-9956-BA215A767540}" srcOrd="0" destOrd="0" presId="urn:microsoft.com/office/officeart/2005/8/layout/lProcess1"/>
+    <dgm:cxn modelId="{E5832CAA-9F1E-4324-99E7-3AB1A1AB45E7}" type="presOf" srcId="{ECBC8715-F487-4C00-90F7-4285DD43656E}" destId="{DE2DB74B-1798-434D-AB5E-70695B3AD95F}" srcOrd="0" destOrd="0" presId="urn:microsoft.com/office/officeart/2005/8/layout/lProcess1"/>
+    <dgm:cxn modelId="{CDE31D88-9C6F-4451-BC6A-513991B557B2}" type="presOf" srcId="{0D3ED482-71AC-4E09-803E-525E23C3B227}" destId="{CD7112E3-6104-4EEA-9F8B-B7415942E8FE}" srcOrd="0" destOrd="0" presId="urn:microsoft.com/office/officeart/2005/8/layout/lProcess1"/>
+    <dgm:cxn modelId="{99B17B38-B741-4155-B8A7-0FC4591379DA}" type="presOf" srcId="{FCED5EEC-BF6E-4ACF-BD83-08CB01BF8675}" destId="{661F3C92-AADA-4747-9147-89721BE60AB5}" srcOrd="0" destOrd="0" presId="urn:microsoft.com/office/officeart/2005/8/layout/lProcess1"/>
+    <dgm:cxn modelId="{99D4BDA5-6D41-495F-A245-6B7A07B41598}" type="presOf" srcId="{D0547F1F-04E3-498F-9DB8-C82633F9CF13}" destId="{2641CD6C-C367-499D-80CE-1D84D9288DF5}" srcOrd="0" destOrd="0" presId="urn:microsoft.com/office/officeart/2005/8/layout/lProcess1"/>
+    <dgm:cxn modelId="{56A3B716-7735-4C12-8CBB-C458DBA21EDD}" srcId="{1BB0636C-C7F1-48A1-8271-46FCC3EFF219}" destId="{8E2A2579-89C7-4BEA-8BF4-1DF44F6F55E6}" srcOrd="1" destOrd="0" parTransId="{8EFDD2F4-4374-47C6-AC69-67CE4E2BB0BE}" sibTransId="{7CFC53EC-611C-44EB-B618-7875677B9893}"/>
+    <dgm:cxn modelId="{32FB86B7-7DE7-4B53-AF12-9D81FEB460DD}" type="presOf" srcId="{5A976395-8DEA-48D6-A47D-BAE388D0B5DA}" destId="{79232466-364B-43FE-8E18-AD66380D4267}" srcOrd="0" destOrd="0" presId="urn:microsoft.com/office/officeart/2005/8/layout/lProcess1"/>
+    <dgm:cxn modelId="{E68E7B5A-CFAD-4ACA-BA05-E1D5CFE8024F}" type="presOf" srcId="{0BF82AA6-96D5-4A7F-9EDF-BDBD6C4CE2B8}" destId="{972459B8-80A4-4BFF-AEE8-BFA6A4F5B7BC}" srcOrd="0" destOrd="0" presId="urn:microsoft.com/office/officeart/2005/8/layout/lProcess1"/>
     <dgm:cxn modelId="{B99C3B90-2C0E-4E62-9D0A-3844BD02B41E}" type="presOf" srcId="{186EA5F9-1BED-4C06-B182-B016FA331FFB}" destId="{004E8E8C-3337-4815-83A5-9180868CD23D}" srcOrd="0" destOrd="0" presId="urn:microsoft.com/office/officeart/2005/8/layout/lProcess1"/>
+    <dgm:cxn modelId="{D44C6B98-9120-4017-A292-3533923FEF20}" srcId="{1BB0636C-C7F1-48A1-8271-46FCC3EFF219}" destId="{E54C6F2A-497C-4674-BC4B-029E14196524}" srcOrd="0" destOrd="0" parTransId="{CA4A9E74-B7DE-465C-A042-3A04D18EA4AB}" sibTransId="{6EF07664-D48C-4917-BFBD-08DB8C68251F}"/>
+    <dgm:cxn modelId="{A1EBF995-EFA2-4618-9E58-33FE2606D3A0}" type="presOf" srcId="{73AE9112-097F-4691-9164-8D0EB8CB76D9}" destId="{623710D2-52C9-4B5D-B717-A4B262FC757F}" srcOrd="0" destOrd="0" presId="urn:microsoft.com/office/officeart/2005/8/layout/lProcess1"/>
+    <dgm:cxn modelId="{468CDA31-A4CC-437A-BABA-0FFB976B45F4}" type="presOf" srcId="{346A265A-6EF0-43E7-AEDC-6AD1B6DDF85A}" destId="{8E5E8A04-D28D-4036-AF63-E37181D6F72F}" srcOrd="0" destOrd="0" presId="urn:microsoft.com/office/officeart/2005/8/layout/lProcess1"/>
+    <dgm:cxn modelId="{A21D8733-897B-4D46-8560-59B54DAF2DCD}" type="presOf" srcId="{360C0236-8E7C-4A9B-86F4-ADC4AA76ECD1}" destId="{023BCC6B-9583-44B1-A8C6-CEE801B9A747}" srcOrd="0" destOrd="0" presId="urn:microsoft.com/office/officeart/2005/8/layout/lProcess1"/>
+    <dgm:cxn modelId="{D66544F6-26E3-460F-B418-F1A44EEDD08D}" type="presOf" srcId="{6161268B-89CE-44F0-B63C-93650AD9DFB1}" destId="{3A0C2E89-C69F-470B-AA8E-DA642D15ED52}" srcOrd="0" destOrd="0" presId="urn:microsoft.com/office/officeart/2005/8/layout/lProcess1"/>
+    <dgm:cxn modelId="{35E11E63-C28F-412C-93B4-FB29B6ACE96D}" type="presOf" srcId="{8DAC51EF-4BF6-4F80-92D7-607D23CE4BBE}" destId="{6CC9942D-8CF8-41F8-A27B-72DB207E9C9B}" srcOrd="0" destOrd="0" presId="urn:microsoft.com/office/officeart/2005/8/layout/lProcess1"/>
+    <dgm:cxn modelId="{0B06A1A4-3017-42C1-93AE-B0DE07606C42}" type="presOf" srcId="{60A4B496-B1DD-4990-BCA0-F4ED28F00137}" destId="{38956430-F19F-400E-A2B5-E2BC078890E0}" srcOrd="0" destOrd="0" presId="urn:microsoft.com/office/officeart/2005/8/layout/lProcess1"/>
+    <dgm:cxn modelId="{8C8C2B67-E9A3-4392-A377-093565C317C1}" type="presOf" srcId="{F358C470-BAEE-4E47-9803-963781AF9A9A}" destId="{85670776-CDB8-4801-A3E5-ABBFCA559329}" srcOrd="0" destOrd="0" presId="urn:microsoft.com/office/officeart/2005/8/layout/lProcess1"/>
+    <dgm:cxn modelId="{A603B7A4-2DA6-45D6-8001-48763B379D59}" srcId="{377E3500-8585-404E-9D08-4140C13B54E2}" destId="{1BB0636C-C7F1-48A1-8271-46FCC3EFF219}" srcOrd="0" destOrd="0" parTransId="{94E1D22B-56B7-4A55-9C67-1A747645D5F2}" sibTransId="{46CD4697-2A92-4F1B-899F-1B807116C1FC}"/>
+    <dgm:cxn modelId="{388F1BA1-04DF-42FE-AFD0-6358A5724EB1}" type="presOf" srcId="{74447616-A52B-45C1-97EA-70C4CEE376D7}" destId="{0E8032D3-502B-41BD-845E-EF3C103EC370}" srcOrd="0" destOrd="0" presId="urn:microsoft.com/office/officeart/2005/8/layout/lProcess1"/>
+    <dgm:cxn modelId="{1158D9BB-DA86-4916-8059-5C2017CF8B70}" srcId="{186EA5F9-1BED-4C06-B182-B016FA331FFB}" destId="{FCED5EEC-BF6E-4ACF-BD83-08CB01BF8675}" srcOrd="3" destOrd="0" parTransId="{D6DFE8B4-1AF1-4FAA-8B9B-9B41464965AE}" sibTransId="{565C5D44-E202-4762-BA12-A67015FE61F3}"/>
+    <dgm:cxn modelId="{3BC1D2D1-60D9-4DA9-8482-5BD6BB32C1C3}" type="presOf" srcId="{A01F37DA-C01F-4400-8563-D8418EB89946}" destId="{3BEF012E-7C7F-4313-8DD7-20EA4255B2FD}" srcOrd="0" destOrd="0" presId="urn:microsoft.com/office/officeart/2005/8/layout/lProcess1"/>
+    <dgm:cxn modelId="{CAC19A43-CCBA-4FD3-A562-BE10D5B06D56}" srcId="{186EA5F9-1BED-4C06-B182-B016FA331FFB}" destId="{F358C470-BAEE-4E47-9803-963781AF9A9A}" srcOrd="7" destOrd="0" parTransId="{9B49B0DF-DC6C-4A2D-9259-8315E2C61C61}" sibTransId="{ECBC8715-F487-4C00-90F7-4285DD43656E}"/>
     <dgm:cxn modelId="{B695600D-3211-4829-AB7A-5247A977896F}" type="presOf" srcId="{91EF51DC-6A99-46F7-AFC2-BBA925CB8350}" destId="{FFF16584-33AE-4680-B3AE-09CBA63E204B}" srcOrd="0" destOrd="0" presId="urn:microsoft.com/office/officeart/2005/8/layout/lProcess1"/>
-    <dgm:cxn modelId="{8B3ADB41-ACAD-4C14-BFD7-99683923AE2E}" type="presOf" srcId="{377E3500-8585-404E-9D08-4140C13B54E2}" destId="{8E039649-0AE6-4E66-AE65-9E0C86962154}" srcOrd="0" destOrd="0" presId="urn:microsoft.com/office/officeart/2005/8/layout/lProcess1"/>
-    <dgm:cxn modelId="{35E11E63-C28F-412C-93B4-FB29B6ACE96D}" type="presOf" srcId="{8DAC51EF-4BF6-4F80-92D7-607D23CE4BBE}" destId="{6CC9942D-8CF8-41F8-A27B-72DB207E9C9B}" srcOrd="0" destOrd="0" presId="urn:microsoft.com/office/officeart/2005/8/layout/lProcess1"/>
-    <dgm:cxn modelId="{BCB8B75F-C7DE-468B-86B2-1B86169A4EC0}" type="presOf" srcId="{1BB0636C-C7F1-48A1-8271-46FCC3EFF219}" destId="{189665C0-EEDD-459E-8D4A-8E338650848B}" srcOrd="0" destOrd="0" presId="urn:microsoft.com/office/officeart/2005/8/layout/lProcess1"/>
-    <dgm:cxn modelId="{EAC1BCBB-117D-4CDF-BA66-07B2B711D05B}" srcId="{377E3500-8585-404E-9D08-4140C13B54E2}" destId="{186EA5F9-1BED-4C06-B182-B016FA331FFB}" srcOrd="1" destOrd="0" parTransId="{DED5BC83-53B8-49CF-99B2-6D9118DB924B}" sibTransId="{E2B20211-2173-4A3C-A6D1-AAE1BB5971A0}"/>
-    <dgm:cxn modelId="{1158D9BB-DA86-4916-8059-5C2017CF8B70}" srcId="{186EA5F9-1BED-4C06-B182-B016FA331FFB}" destId="{FCED5EEC-BF6E-4ACF-BD83-08CB01BF8675}" srcOrd="3" destOrd="0" parTransId="{D6DFE8B4-1AF1-4FAA-8B9B-9B41464965AE}" sibTransId="{565C5D44-E202-4762-BA12-A67015FE61F3}"/>
-    <dgm:cxn modelId="{04C47416-BF13-4C0E-A0D7-2FAAEE6DAB10}" type="presOf" srcId="{703D37DA-9D04-48C7-9917-03C11B75579F}" destId="{FA2DC799-6746-4A73-AA04-A3161797863C}" srcOrd="0" destOrd="0" presId="urn:microsoft.com/office/officeart/2005/8/layout/lProcess1"/>
-    <dgm:cxn modelId="{E5832CAA-9F1E-4324-99E7-3AB1A1AB45E7}" type="presOf" srcId="{ECBC8715-F487-4C00-90F7-4285DD43656E}" destId="{DE2DB74B-1798-434D-AB5E-70695B3AD95F}" srcOrd="0" destOrd="0" presId="urn:microsoft.com/office/officeart/2005/8/layout/lProcess1"/>
-    <dgm:cxn modelId="{56A3B716-7735-4C12-8CBB-C458DBA21EDD}" srcId="{1BB0636C-C7F1-48A1-8271-46FCC3EFF219}" destId="{8E2A2579-89C7-4BEA-8BF4-1DF44F6F55E6}" srcOrd="1" destOrd="0" parTransId="{8EFDD2F4-4374-47C6-AC69-67CE4E2BB0BE}" sibTransId="{7CFC53EC-611C-44EB-B618-7875677B9893}"/>
-    <dgm:cxn modelId="{57C6F165-A568-4C7A-8590-54E80981EEB4}" srcId="{186EA5F9-1BED-4C06-B182-B016FA331FFB}" destId="{0AA5AB4A-EACF-4C20-B35B-E19CE7E60213}" srcOrd="9" destOrd="0" parTransId="{27C745D0-C849-426D-99CC-7751E9DF5859}" sibTransId="{B568009E-334F-44AB-AF8E-E54120294878}"/>
-    <dgm:cxn modelId="{4B524FEA-E671-4B02-8703-C90053A3A966}" type="presOf" srcId="{0AD9C268-E417-4DBD-B145-00EFE77ED46C}" destId="{7BEB1777-A344-438B-BF3C-16D3BF0B94C8}" srcOrd="0" destOrd="0" presId="urn:microsoft.com/office/officeart/2005/8/layout/lProcess1"/>
-    <dgm:cxn modelId="{1718DFC8-01ED-4D0D-A005-335FA176F77D}" type="presOf" srcId="{1645CB60-6D54-4567-A27F-A13ADC81D2E4}" destId="{B37383AF-9B7A-42A6-B08D-32613F242FB7}" srcOrd="0" destOrd="0" presId="urn:microsoft.com/office/officeart/2005/8/layout/lProcess1"/>
-    <dgm:cxn modelId="{2D78A0F9-AFAC-4983-BDEA-E2CD3F78DEF1}" type="presOf" srcId="{E54C6F2A-497C-4674-BC4B-029E14196524}" destId="{321DC9E4-1828-4EE3-ABDE-6EF207FFA05A}" srcOrd="0" destOrd="0" presId="urn:microsoft.com/office/officeart/2005/8/layout/lProcess1"/>
-    <dgm:cxn modelId="{3BC1D2D1-60D9-4DA9-8482-5BD6BB32C1C3}" type="presOf" srcId="{A01F37DA-C01F-4400-8563-D8418EB89946}" destId="{3BEF012E-7C7F-4313-8DD7-20EA4255B2FD}" srcOrd="0" destOrd="0" presId="urn:microsoft.com/office/officeart/2005/8/layout/lProcess1"/>
-    <dgm:cxn modelId="{0DDFF8AD-1C65-4436-8413-EFAA11AF2576}" type="presOf" srcId="{7CFC53EC-611C-44EB-B618-7875677B9893}" destId="{76F52F46-BAC2-4306-9498-EFC0E2E5EF03}" srcOrd="0" destOrd="0" presId="urn:microsoft.com/office/officeart/2005/8/layout/lProcess1"/>
-    <dgm:cxn modelId="{E68E7B5A-CFAD-4ACA-BA05-E1D5CFE8024F}" type="presOf" srcId="{0BF82AA6-96D5-4A7F-9EDF-BDBD6C4CE2B8}" destId="{972459B8-80A4-4BFF-AEE8-BFA6A4F5B7BC}" srcOrd="0" destOrd="0" presId="urn:microsoft.com/office/officeart/2005/8/layout/lProcess1"/>
+    <dgm:cxn modelId="{97218399-F8CF-46D8-B899-EDC945FB4F76}" type="presOf" srcId="{7A650265-7FF4-480C-A8E7-12BAC875AA61}" destId="{6786D247-C386-4209-B9B5-98D8F2E9AF21}" srcOrd="0" destOrd="0" presId="urn:microsoft.com/office/officeart/2005/8/layout/lProcess1"/>
+    <dgm:cxn modelId="{73EACE7C-8488-45FB-B3AA-A0856795C339}" type="presOf" srcId="{EFD33CA1-C47A-4427-84FB-37C18717486F}" destId="{64097DF6-3CF6-4242-9C53-075F4AAB23F3}" srcOrd="0" destOrd="0" presId="urn:microsoft.com/office/officeart/2005/8/layout/lProcess1"/>
+    <dgm:cxn modelId="{29FDD577-CD7E-4AD4-A0C8-D34DF7DFF5C4}" srcId="{186EA5F9-1BED-4C06-B182-B016FA331FFB}" destId="{D0547F1F-04E3-498F-9DB8-C82633F9CF13}" srcOrd="1" destOrd="0" parTransId="{AF9D6714-CA5A-4116-B9A7-7C843825361D}" sibTransId="{821A642D-700D-4E53-8E2A-631D151B86E5}"/>
+    <dgm:cxn modelId="{2972A115-60D5-458D-96DC-9D594A7BE0D6}" srcId="{1BB0636C-C7F1-48A1-8271-46FCC3EFF219}" destId="{8DAC51EF-4BF6-4F80-92D7-607D23CE4BBE}" srcOrd="7" destOrd="0" parTransId="{85BA5B28-2B12-408A-9502-CD37A368DB24}" sibTransId="{A01F37DA-C01F-4400-8563-D8418EB89946}"/>
     <dgm:cxn modelId="{A015FF10-49A4-4B43-B0EC-E09918D791F9}" srcId="{1BB0636C-C7F1-48A1-8271-46FCC3EFF219}" destId="{C89AF841-141A-4818-BA7B-C2C1BA7C1BB3}" srcOrd="4" destOrd="0" parTransId="{6EA441E3-EB9E-43EF-A76B-472DD5C2D9AD}" sibTransId="{08747053-149D-471B-B170-B59D52A97313}"/>
-    <dgm:cxn modelId="{117E3458-6A5A-4280-B736-CCB81967D6DC}" srcId="{186EA5F9-1BED-4C06-B182-B016FA331FFB}" destId="{91EF51DC-6A99-46F7-AFC2-BBA925CB8350}" srcOrd="8" destOrd="0" parTransId="{9BB9EFA5-867C-4266-AFF0-CEDE3D210E35}" sibTransId="{5356D253-13A4-4E63-9090-ACD4D516A1F9}"/>
-    <dgm:cxn modelId="{97218399-F8CF-46D8-B899-EDC945FB4F76}" type="presOf" srcId="{7A650265-7FF4-480C-A8E7-12BAC875AA61}" destId="{6786D247-C386-4209-B9B5-98D8F2E9AF21}" srcOrd="0" destOrd="0" presId="urn:microsoft.com/office/officeart/2005/8/layout/lProcess1"/>
-    <dgm:cxn modelId="{CAC19A43-CCBA-4FD3-A562-BE10D5B06D56}" srcId="{186EA5F9-1BED-4C06-B182-B016FA331FFB}" destId="{F358C470-BAEE-4E47-9803-963781AF9A9A}" srcOrd="7" destOrd="0" parTransId="{9B49B0DF-DC6C-4A2D-9259-8315E2C61C61}" sibTransId="{ECBC8715-F487-4C00-90F7-4285DD43656E}"/>
-    <dgm:cxn modelId="{E21A1861-A885-404B-82E2-4E6DD03997AF}" srcId="{186EA5F9-1BED-4C06-B182-B016FA331FFB}" destId="{6161268B-89CE-44F0-B63C-93650AD9DFB1}" srcOrd="5" destOrd="0" parTransId="{95DAD433-C5C7-4CF6-8E99-95BCEF62E738}" sibTransId="{4641B145-6B04-4411-8AC9-7DD52129D40B}"/>
-    <dgm:cxn modelId="{CDE31D88-9C6F-4451-BC6A-513991B557B2}" type="presOf" srcId="{0D3ED482-71AC-4E09-803E-525E23C3B227}" destId="{CD7112E3-6104-4EEA-9F8B-B7415942E8FE}" srcOrd="0" destOrd="0" presId="urn:microsoft.com/office/officeart/2005/8/layout/lProcess1"/>
-    <dgm:cxn modelId="{D4450FC6-6620-4792-B396-E8E19DBE44F4}" srcId="{1BB0636C-C7F1-48A1-8271-46FCC3EFF219}" destId="{360C0236-8E7C-4A9B-86F4-ADC4AA76ECD1}" srcOrd="6" destOrd="0" parTransId="{B57EA4D9-ED4F-40C8-8106-240E80E97DFF}" sibTransId="{994012F0-68DB-4730-9C9C-A29CAF9753B4}"/>
-    <dgm:cxn modelId="{A1EBF995-EFA2-4618-9E58-33FE2606D3A0}" type="presOf" srcId="{73AE9112-097F-4691-9164-8D0EB8CB76D9}" destId="{623710D2-52C9-4B5D-B717-A4B262FC757F}" srcOrd="0" destOrd="0" presId="urn:microsoft.com/office/officeart/2005/8/layout/lProcess1"/>
-    <dgm:cxn modelId="{31D7DC1E-D0CC-47E9-9CA9-2C9D4CBC1584}" type="presOf" srcId="{4641B145-6B04-4411-8AC9-7DD52129D40B}" destId="{E0C0A71F-9DCE-4CCE-9956-BA215A767540}" srcOrd="0" destOrd="0" presId="urn:microsoft.com/office/officeart/2005/8/layout/lProcess1"/>
-    <dgm:cxn modelId="{A603B7A4-2DA6-45D6-8001-48763B379D59}" srcId="{377E3500-8585-404E-9D08-4140C13B54E2}" destId="{1BB0636C-C7F1-48A1-8271-46FCC3EFF219}" srcOrd="0" destOrd="0" parTransId="{94E1D22B-56B7-4A55-9C67-1A747645D5F2}" sibTransId="{46CD4697-2A92-4F1B-899F-1B807116C1FC}"/>
-    <dgm:cxn modelId="{B11975DD-9194-4E36-8B4C-A0938DE06C7B}" type="presOf" srcId="{4A5812CE-7D24-4A4E-8D8D-151FB9BD13D6}" destId="{B9C94445-6ACC-47CD-AE48-DEC7FDC9F535}" srcOrd="0" destOrd="0" presId="urn:microsoft.com/office/officeart/2005/8/layout/lProcess1"/>
-    <dgm:cxn modelId="{99D4BDA5-6D41-495F-A245-6B7A07B41598}" type="presOf" srcId="{D0547F1F-04E3-498F-9DB8-C82633F9CF13}" destId="{2641CD6C-C367-499D-80CE-1D84D9288DF5}" srcOrd="0" destOrd="0" presId="urn:microsoft.com/office/officeart/2005/8/layout/lProcess1"/>
-    <dgm:cxn modelId="{D66544F6-26E3-460F-B418-F1A44EEDD08D}" type="presOf" srcId="{6161268B-89CE-44F0-B63C-93650AD9DFB1}" destId="{3A0C2E89-C69F-470B-AA8E-DA642D15ED52}" srcOrd="0" destOrd="0" presId="urn:microsoft.com/office/officeart/2005/8/layout/lProcess1"/>
-    <dgm:cxn modelId="{028FD50E-ABCC-48AD-B918-90EA9F66D905}" srcId="{1BB0636C-C7F1-48A1-8271-46FCC3EFF219}" destId="{73AE9112-097F-4691-9164-8D0EB8CB76D9}" srcOrd="2" destOrd="0" parTransId="{01597230-898A-4494-82C4-5BAB5DCE8A80}" sibTransId="{346A265A-6EF0-43E7-AEDC-6AD1B6DDF85A}"/>
+    <dgm:cxn modelId="{5C7743A4-6C09-4446-9984-183046478772}" srcId="{1BB0636C-C7F1-48A1-8271-46FCC3EFF219}" destId="{0AD9C268-E417-4DBD-B145-00EFE77ED46C}" srcOrd="5" destOrd="0" parTransId="{3304EC09-A0AE-4333-B6B2-3984D26C2E8D}" sibTransId="{5A976395-8DEA-48D6-A47D-BAE388D0B5DA}"/>
+    <dgm:cxn modelId="{924E72B7-43C2-4FF6-B14C-3C0CA73D5E2C}" type="presOf" srcId="{994012F0-68DB-4730-9C9C-A29CAF9753B4}" destId="{2138C29A-0D85-40A5-82F4-9FC397B84FE9}" srcOrd="0" destOrd="0" presId="urn:microsoft.com/office/officeart/2005/8/layout/lProcess1"/>
+    <dgm:cxn modelId="{547CC7C7-5A2A-44FF-B10F-01BA1B3B3989}" type="presOf" srcId="{0AA5AB4A-EACF-4C20-B35B-E19CE7E60213}" destId="{167AC13F-E107-42A1-A60B-7FF28F58AE54}" srcOrd="0" destOrd="0" presId="urn:microsoft.com/office/officeart/2005/8/layout/lProcess1"/>
     <dgm:cxn modelId="{4966585F-BBE3-42EC-BF44-5C0BD8C9418A}" srcId="{186EA5F9-1BED-4C06-B182-B016FA331FFB}" destId="{1645CB60-6D54-4567-A27F-A13ADC81D2E4}" srcOrd="6" destOrd="0" parTransId="{AC5139EB-569E-4BC2-A144-F30CDC3A9864}" sibTransId="{CCEF4520-D58B-4CBA-BA7E-FB8ACAF80541}"/>
-    <dgm:cxn modelId="{29FDD577-CD7E-4AD4-A0C8-D34DF7DFF5C4}" srcId="{186EA5F9-1BED-4C06-B182-B016FA331FFB}" destId="{D0547F1F-04E3-498F-9DB8-C82633F9CF13}" srcOrd="1" destOrd="0" parTransId="{AF9D6714-CA5A-4116-B9A7-7C843825361D}" sibTransId="{821A642D-700D-4E53-8E2A-631D151B86E5}"/>
-    <dgm:cxn modelId="{97C18EB8-A7AD-4785-8A22-60A43A86292A}" srcId="{186EA5F9-1BED-4C06-B182-B016FA331FFB}" destId="{FC6BDF1B-7666-4901-8933-E59C87501C83}" srcOrd="4" destOrd="0" parTransId="{423A87BC-601A-45E9-BAB5-4E74775C65AB}" sibTransId="{82FA9713-DD07-416F-88F4-532B5F2EAC90}"/>
-    <dgm:cxn modelId="{D44C6B98-9120-4017-A292-3533923FEF20}" srcId="{1BB0636C-C7F1-48A1-8271-46FCC3EFF219}" destId="{E54C6F2A-497C-4674-BC4B-029E14196524}" srcOrd="0" destOrd="0" parTransId="{CA4A9E74-B7DE-465C-A042-3A04D18EA4AB}" sibTransId="{6EF07664-D48C-4917-BFBD-08DB8C68251F}"/>
-    <dgm:cxn modelId="{2972A115-60D5-458D-96DC-9D594A7BE0D6}" srcId="{1BB0636C-C7F1-48A1-8271-46FCC3EFF219}" destId="{8DAC51EF-4BF6-4F80-92D7-607D23CE4BBE}" srcOrd="7" destOrd="0" parTransId="{85BA5B28-2B12-408A-9502-CD37A368DB24}" sibTransId="{A01F37DA-C01F-4400-8563-D8418EB89946}"/>
-    <dgm:cxn modelId="{B3ECD102-5FDD-4276-B6CA-C1764FB8BCF4}" type="presOf" srcId="{6EF07664-D48C-4917-BFBD-08DB8C68251F}" destId="{F749CD68-74B8-49A9-81E4-07F3CE1FCE0A}" srcOrd="0" destOrd="0" presId="urn:microsoft.com/office/officeart/2005/8/layout/lProcess1"/>
-    <dgm:cxn modelId="{C203885F-897F-4F48-A959-1564A9653E83}" type="presOf" srcId="{821A642D-700D-4E53-8E2A-631D151B86E5}" destId="{067AC13A-A371-44AB-9940-004A06B6B4CB}" srcOrd="0" destOrd="0" presId="urn:microsoft.com/office/officeart/2005/8/layout/lProcess1"/>
-    <dgm:cxn modelId="{05055B12-1E74-4EB2-BA6A-C6B1233A6E99}" type="presOf" srcId="{08747053-149D-471B-B170-B59D52A97313}" destId="{056A8768-C0C8-4387-8D87-25CB5E4C3677}" srcOrd="0" destOrd="0" presId="urn:microsoft.com/office/officeart/2005/8/layout/lProcess1"/>
-    <dgm:cxn modelId="{32FB86B7-7DE7-4B53-AF12-9D81FEB460DD}" type="presOf" srcId="{5A976395-8DEA-48D6-A47D-BAE388D0B5DA}" destId="{79232466-364B-43FE-8E18-AD66380D4267}" srcOrd="0" destOrd="0" presId="urn:microsoft.com/office/officeart/2005/8/layout/lProcess1"/>
-    <dgm:cxn modelId="{388F1BA1-04DF-42FE-AFD0-6358A5724EB1}" type="presOf" srcId="{74447616-A52B-45C1-97EA-70C4CEE376D7}" destId="{0E8032D3-502B-41BD-845E-EF3C103EC370}" srcOrd="0" destOrd="0" presId="urn:microsoft.com/office/officeart/2005/8/layout/lProcess1"/>
-    <dgm:cxn modelId="{AF2B2E06-B66C-455F-9862-6CCF2DA9D487}" type="presOf" srcId="{7FFA533E-BFF8-4B89-92D1-07957357D3B5}" destId="{BCA9ED3A-6EA1-4F2C-969F-00240FBE72B9}" srcOrd="0" destOrd="0" presId="urn:microsoft.com/office/officeart/2005/8/layout/lProcess1"/>
     <dgm:cxn modelId="{BC874C53-FF49-4E75-866F-6F657676E48F}" srcId="{186EA5F9-1BED-4C06-B182-B016FA331FFB}" destId="{4A5812CE-7D24-4A4E-8D8D-151FB9BD13D6}" srcOrd="0" destOrd="0" parTransId="{74447616-A52B-45C1-97EA-70C4CEE376D7}" sibTransId="{0D3ED482-71AC-4E09-803E-525E23C3B227}"/>
-    <dgm:cxn modelId="{BE9D3FCA-3729-4C3A-A50A-DE38C8C8F35E}" srcId="{1BB0636C-C7F1-48A1-8271-46FCC3EFF219}" destId="{7FFA533E-BFF8-4B89-92D1-07957357D3B5}" srcOrd="8" destOrd="0" parTransId="{77E7F068-ED25-4D80-A150-EEA6358778C3}" sibTransId="{703D37DA-9D04-48C7-9917-03C11B75579F}"/>
-    <dgm:cxn modelId="{DC749A12-BC13-4509-8165-7D6CCEA5A157}" type="presOf" srcId="{CCEF4520-D58B-4CBA-BA7E-FB8ACAF80541}" destId="{411430FF-FF48-4D0B-9C34-5A7CCD3CC292}" srcOrd="0" destOrd="0" presId="urn:microsoft.com/office/officeart/2005/8/layout/lProcess1"/>
-    <dgm:cxn modelId="{52FB74AC-2C5E-4D9F-B33A-79B1346C5D0B}" type="presOf" srcId="{5356D253-13A4-4E63-9090-ACD4D516A1F9}" destId="{73A46A9C-C56D-49E2-A3F6-0D259BCDB23D}" srcOrd="0" destOrd="0" presId="urn:microsoft.com/office/officeart/2005/8/layout/lProcess1"/>
-    <dgm:cxn modelId="{924E72B7-43C2-4FF6-B14C-3C0CA73D5E2C}" type="presOf" srcId="{994012F0-68DB-4730-9C9C-A29CAF9753B4}" destId="{2138C29A-0D85-40A5-82F4-9FC397B84FE9}" srcOrd="0" destOrd="0" presId="urn:microsoft.com/office/officeart/2005/8/layout/lProcess1"/>
-    <dgm:cxn modelId="{468CDA31-A4CC-437A-BABA-0FFB976B45F4}" type="presOf" srcId="{346A265A-6EF0-43E7-AEDC-6AD1B6DDF85A}" destId="{8E5E8A04-D28D-4036-AF63-E37181D6F72F}" srcOrd="0" destOrd="0" presId="urn:microsoft.com/office/officeart/2005/8/layout/lProcess1"/>
-    <dgm:cxn modelId="{4B6A62CF-D146-4CC5-A5B5-4BE7297BB017}" type="presOf" srcId="{FC6BDF1B-7666-4901-8933-E59C87501C83}" destId="{26F54F58-F169-4CAA-AEB3-26B67A97B3C8}" srcOrd="0" destOrd="0" presId="urn:microsoft.com/office/officeart/2005/8/layout/lProcess1"/>
-    <dgm:cxn modelId="{5722AB07-A8D1-4201-ABDD-6010F1E241D9}" type="presOf" srcId="{8E2A2579-89C7-4BEA-8BF4-1DF44F6F55E6}" destId="{4E44D5A5-63B1-41D5-9FDF-F41902F20B19}" srcOrd="0" destOrd="0" presId="urn:microsoft.com/office/officeart/2005/8/layout/lProcess1"/>
-    <dgm:cxn modelId="{8C8C2B67-E9A3-4392-A377-093565C317C1}" type="presOf" srcId="{F358C470-BAEE-4E47-9803-963781AF9A9A}" destId="{85670776-CDB8-4801-A3E5-ABBFCA559329}" srcOrd="0" destOrd="0" presId="urn:microsoft.com/office/officeart/2005/8/layout/lProcess1"/>
-    <dgm:cxn modelId="{90001CCB-52ED-4696-A008-6749B01BE337}" srcId="{186EA5F9-1BED-4C06-B182-B016FA331FFB}" destId="{60A4B496-B1DD-4990-BCA0-F4ED28F00137}" srcOrd="2" destOrd="0" parTransId="{057038AB-4A16-4F30-B6F9-B282D4D02CD5}" sibTransId="{7A650265-7FF4-480C-A8E7-12BAC875AA61}"/>
-    <dgm:cxn modelId="{A21D8733-897B-4D46-8560-59B54DAF2DCD}" type="presOf" srcId="{360C0236-8E7C-4A9B-86F4-ADC4AA76ECD1}" destId="{023BCC6B-9583-44B1-A8C6-CEE801B9A747}" srcOrd="0" destOrd="0" presId="urn:microsoft.com/office/officeart/2005/8/layout/lProcess1"/>
-    <dgm:cxn modelId="{C0A5EEB7-0734-4EDB-AE56-CA6E7780DBCF}" type="presOf" srcId="{61B9C7FC-4601-4633-97D9-AEFB53A31398}" destId="{AF0DE083-F133-40B8-9946-2424AE07A5D2}" srcOrd="0" destOrd="0" presId="urn:microsoft.com/office/officeart/2005/8/layout/lProcess1"/>
-    <dgm:cxn modelId="{C37A0620-39E5-45DB-8CB0-7B544535EA5B}" type="presOf" srcId="{C89AF841-141A-4818-BA7B-C2C1BA7C1BB3}" destId="{C64FB877-5306-40BE-9CA9-5764B3AFBE36}" srcOrd="0" destOrd="0" presId="urn:microsoft.com/office/officeart/2005/8/layout/lProcess1"/>
-    <dgm:cxn modelId="{0B06A1A4-3017-42C1-93AE-B0DE07606C42}" type="presOf" srcId="{60A4B496-B1DD-4990-BCA0-F4ED28F00137}" destId="{38956430-F19F-400E-A2B5-E2BC078890E0}" srcOrd="0" destOrd="0" presId="urn:microsoft.com/office/officeart/2005/8/layout/lProcess1"/>
-    <dgm:cxn modelId="{C56F8FA8-9860-4169-A8E9-940430BED623}" type="presOf" srcId="{CA4A9E74-B7DE-465C-A042-3A04D18EA4AB}" destId="{2B631270-A20E-48C9-8196-9D41D4D19ACE}" srcOrd="0" destOrd="0" presId="urn:microsoft.com/office/officeart/2005/8/layout/lProcess1"/>
-    <dgm:cxn modelId="{87BC4E66-4B16-4A09-A820-4519C6C65DB7}" srcId="{1BB0636C-C7F1-48A1-8271-46FCC3EFF219}" destId="{61B9C7FC-4601-4633-97D9-AEFB53A31398}" srcOrd="3" destOrd="0" parTransId="{A45FF0C9-4F27-444E-96DC-E79BB01A6A14}" sibTransId="{EFD33CA1-C47A-4427-84FB-37C18717486F}"/>
-    <dgm:cxn modelId="{73EACE7C-8488-45FB-B3AA-A0856795C339}" type="presOf" srcId="{EFD33CA1-C47A-4427-84FB-37C18717486F}" destId="{64097DF6-3CF6-4242-9C53-075F4AAB23F3}" srcOrd="0" destOrd="0" presId="urn:microsoft.com/office/officeart/2005/8/layout/lProcess1"/>
-    <dgm:cxn modelId="{CABF9AA9-7FD7-4C75-9F19-D24F3AB0D3A1}" type="presOf" srcId="{565C5D44-E202-4762-BA12-A67015FE61F3}" destId="{3D7EA5B8-DFDF-4409-8C6A-F6473BAEF845}" srcOrd="0" destOrd="0" presId="urn:microsoft.com/office/officeart/2005/8/layout/lProcess1"/>
-    <dgm:cxn modelId="{5C7743A4-6C09-4446-9984-183046478772}" srcId="{1BB0636C-C7F1-48A1-8271-46FCC3EFF219}" destId="{0AD9C268-E417-4DBD-B145-00EFE77ED46C}" srcOrd="5" destOrd="0" parTransId="{3304EC09-A0AE-4333-B6B2-3984D26C2E8D}" sibTransId="{5A976395-8DEA-48D6-A47D-BAE388D0B5DA}"/>
-    <dgm:cxn modelId="{3D4C1769-DE4D-4AC7-960F-F50021005909}" type="presOf" srcId="{82FA9713-DD07-416F-88F4-532B5F2EAC90}" destId="{A0811A12-5B41-4B45-993D-6867CBD70BE7}" srcOrd="0" destOrd="0" presId="urn:microsoft.com/office/officeart/2005/8/layout/lProcess1"/>
-    <dgm:cxn modelId="{99B17B38-B741-4155-B8A7-0FC4591379DA}" type="presOf" srcId="{FCED5EEC-BF6E-4ACF-BD83-08CB01BF8675}" destId="{661F3C92-AADA-4747-9147-89721BE60AB5}" srcOrd="0" destOrd="0" presId="urn:microsoft.com/office/officeart/2005/8/layout/lProcess1"/>
-    <dgm:cxn modelId="{992054C4-AAFA-46DF-AE80-2F7C11233426}" srcId="{1BB0636C-C7F1-48A1-8271-46FCC3EFF219}" destId="{0BF82AA6-96D5-4A7F-9EDF-BDBD6C4CE2B8}" srcOrd="9" destOrd="0" parTransId="{700B5907-8BCC-4D7D-89F5-5E2725D80FEA}" sibTransId="{67B033B4-13E0-43E4-B27D-76408437EA3F}"/>
-    <dgm:cxn modelId="{547CC7C7-5A2A-44FF-B10F-01BA1B3B3989}" type="presOf" srcId="{0AA5AB4A-EACF-4C20-B35B-E19CE7E60213}" destId="{167AC13F-E107-42A1-A60B-7FF28F58AE54}" srcOrd="0" destOrd="0" presId="urn:microsoft.com/office/officeart/2005/8/layout/lProcess1"/>
     <dgm:cxn modelId="{15B889F6-C5A4-4360-8703-9C5984D97DB0}" type="presParOf" srcId="{8E039649-0AE6-4E66-AE65-9E0C86962154}" destId="{322B12C1-7313-4A91-8CAD-1CAF516A92DA}" srcOrd="0" destOrd="0" presId="urn:microsoft.com/office/officeart/2005/8/layout/lProcess1"/>
     <dgm:cxn modelId="{701ADF67-4E9F-4E77-883B-D7278730D4A2}" type="presParOf" srcId="{322B12C1-7313-4A91-8CAD-1CAF516A92DA}" destId="{189665C0-EEDD-459E-8D4A-8E338650848B}" srcOrd="0" destOrd="0" presId="urn:microsoft.com/office/officeart/2005/8/layout/lProcess1"/>
     <dgm:cxn modelId="{081E7D05-C652-4114-B92C-0483EE65FC73}" type="presParOf" srcId="{322B12C1-7313-4A91-8CAD-1CAF516A92DA}" destId="{2B631270-A20E-48C9-8196-9D41D4D19ACE}" srcOrd="1" destOrd="0" presId="urn:microsoft.com/office/officeart/2005/8/layout/lProcess1"/>
@@ -8161,7 +8161,7 @@
             <a:fld id="{1D8BD707-D9CF-40AE-B4C6-C98DA3205C09}" type="datetimeFigureOut">
               <a:rPr lang="en-US" smtClean="0"/>
               <a:pPr/>
-              <a:t>10/22/2008</a:t>
+              <a:t>10/23/2008</a:t>
             </a:fld>
             <a:endParaRPr lang="en-US"/>
           </a:p>
@@ -8484,7 +8484,7 @@
             <a:fld id="{1D8BD707-D9CF-40AE-B4C6-C98DA3205C09}" type="datetimeFigureOut">
               <a:rPr lang="en-US" smtClean="0"/>
               <a:pPr/>
-              <a:t>10/22/2008</a:t>
+              <a:t>10/23/2008</a:t>
             </a:fld>
             <a:endParaRPr lang="en-US"/>
           </a:p>
@@ -9554,15 +9554,7 @@
                     <a:schemeClr val="tx1"/>
                   </a:solidFill>
                 </a:rPr>
-                <a:t>fatal</a:t>
-              </a:r>
-              <a:r>
-                <a:rPr lang="en-US" sz="1200" b="1" smtClean="0">
-                  <a:solidFill>
-                    <a:schemeClr val="tx1"/>
-                  </a:solidFill>
-                </a:rPr>
-                <a:t>()</a:t>
+                <a:t>fatal()</a:t>
               </a:r>
             </a:p>
             <a:p>
@@ -9600,7 +9592,23 @@
                     <a:schemeClr val="tx1"/>
                   </a:solidFill>
                 </a:rPr>
-                <a:t>Warning()</a:t>
+                <a:t>w</a:t>
+              </a:r>
+              <a:r>
+                <a:rPr lang="en-US" sz="1200" b="1" smtClean="0">
+                  <a:solidFill>
+                    <a:schemeClr val="tx1"/>
+                  </a:solidFill>
+                </a:rPr>
+                <a:t>arning</a:t>
+              </a:r>
+              <a:r>
+                <a:rPr lang="en-US" sz="1200" b="1" smtClean="0">
+                  <a:solidFill>
+                    <a:schemeClr val="tx1"/>
+                  </a:solidFill>
+                </a:rPr>
+                <a:t>()</a:t>
               </a:r>
             </a:p>
             <a:p>
@@ -22371,15 +22379,7 @@
                     <a:schemeClr val="tx1"/>
                   </a:solidFill>
                 </a:rPr>
-                <a:t>En</a:t>
-              </a:r>
-              <a:r>
-                <a:rPr lang="en-US" sz="1400" b="1" smtClean="0">
-                  <a:solidFill>
-                    <a:schemeClr val="tx1"/>
-                  </a:solidFill>
-                </a:rPr>
-                <a:t>coding</a:t>
+                <a:t>Encoding</a:t>
               </a:r>
               <a:endParaRPr lang="en-US" sz="1400" b="1" dirty="0" smtClean="0">
                 <a:solidFill>
@@ -23647,15 +23647,7 @@
                     <a:schemeClr val="tx1"/>
                   </a:solidFill>
                 </a:rPr>
-                <a:t>Entity </a:t>
-              </a:r>
-              <a:r>
-                <a:rPr lang="en-US" sz="1200" b="1" smtClean="0">
-                  <a:solidFill>
-                    <a:schemeClr val="tx1"/>
-                  </a:solidFill>
-                </a:rPr>
-                <a:t>Codec</a:t>
+                <a:t>Entity Codec</a:t>
               </a:r>
               <a:endParaRPr lang="en-US" sz="1200" b="1" dirty="0" smtClean="0">
                 <a:solidFill>
@@ -23679,15 +23671,7 @@
                     <a:schemeClr val="tx1"/>
                   </a:solidFill>
                 </a:rPr>
-                <a:t>Percent </a:t>
-              </a:r>
-              <a:r>
-                <a:rPr lang="en-US" sz="1200" b="1" smtClean="0">
-                  <a:solidFill>
-                    <a:schemeClr val="tx1"/>
-                  </a:solidFill>
-                </a:rPr>
-                <a:t>Codec</a:t>
+                <a:t>Percent Codec</a:t>
               </a:r>
               <a:endParaRPr lang="en-US" sz="1200" b="1" dirty="0" smtClean="0">
                 <a:solidFill>
@@ -23711,15 +23695,7 @@
                     <a:schemeClr val="tx1"/>
                   </a:solidFill>
                 </a:rPr>
-                <a:t>JavaScript </a:t>
-              </a:r>
-              <a:r>
-                <a:rPr lang="en-US" sz="1200" b="1" smtClean="0">
-                  <a:solidFill>
-                    <a:schemeClr val="tx1"/>
-                  </a:solidFill>
-                </a:rPr>
-                <a:t>Codec</a:t>
+                <a:t>JavaScript Codec</a:t>
               </a:r>
               <a:endParaRPr lang="en-US" sz="1200" b="1" dirty="0" smtClean="0">
                 <a:solidFill>
@@ -23743,15 +23719,7 @@
                     <a:schemeClr val="tx1"/>
                   </a:solidFill>
                 </a:rPr>
-                <a:t>VBScript </a:t>
-              </a:r>
-              <a:r>
-                <a:rPr lang="en-US" sz="1200" b="1" smtClean="0">
-                  <a:solidFill>
-                    <a:schemeClr val="tx1"/>
-                  </a:solidFill>
-                </a:rPr>
-                <a:t>Codec</a:t>
+                <a:t>VBScript Codec</a:t>
               </a:r>
               <a:endParaRPr lang="en-US" sz="1200" b="1" dirty="0" smtClean="0">
                 <a:solidFill>
@@ -23775,15 +23743,7 @@
                     <a:schemeClr val="tx1"/>
                   </a:solidFill>
                 </a:rPr>
-                <a:t>CSS </a:t>
-              </a:r>
-              <a:r>
-                <a:rPr lang="en-US" sz="1200" b="1" smtClean="0">
-                  <a:solidFill>
-                    <a:schemeClr val="tx1"/>
-                  </a:solidFill>
-                </a:rPr>
-                <a:t>Codec</a:t>
+                <a:t>CSS Codec</a:t>
               </a:r>
               <a:endParaRPr lang="en-US" sz="1200" b="1" dirty="0" smtClean="0">
                 <a:solidFill>
@@ -27171,15 +27131,7 @@
                     <a:schemeClr val="tx1"/>
                   </a:solidFill>
                 </a:rPr>
-                <a:t>getSafeFileUploads</a:t>
-              </a:r>
-              <a:r>
-                <a:rPr lang="en-US" sz="1200" b="1" smtClean="0">
-                  <a:solidFill>
-                    <a:schemeClr val="tx1"/>
-                  </a:solidFill>
-                </a:rPr>
-                <a:t>()</a:t>
+                <a:t>getSafeFileUploads()</a:t>
               </a:r>
             </a:p>
             <a:p>
@@ -27400,15 +27352,7 @@
                     <a:schemeClr val="tx1"/>
                   </a:solidFill>
                 </a:rPr>
-                <a:t>addCSRFToken</a:t>
-              </a:r>
-              <a:r>
-                <a:rPr lang="en-US" sz="1200" b="1" smtClean="0">
-                  <a:solidFill>
-                    <a:schemeClr val="tx1"/>
-                  </a:solidFill>
-                </a:rPr>
-                <a:t>()</a:t>
+                <a:t>addCSRFToken()</a:t>
               </a:r>
             </a:p>
             <a:p>

</xml_diff>